<commit_message>
Fix issues with plots
</commit_message>
<xml_diff>
--- a/Лятна почивка.pptx
+++ b/Лятна почивка.pptx
@@ -255,7 +255,7 @@
           <a:p>
             <a:fld id="{6E936EF6-BF30-429C-A441-C377F1C3A04C}" type="datetimeFigureOut">
               <a:rPr lang="en-US" smtClean="0"/>
-              <a:t>1/22/2016</a:t>
+              <a:t>1/24/2016</a:t>
             </a:fld>
             <a:endParaRPr lang="en-US"/>
           </a:p>
@@ -425,7 +425,7 @@
           <a:p>
             <a:fld id="{6E936EF6-BF30-429C-A441-C377F1C3A04C}" type="datetimeFigureOut">
               <a:rPr lang="en-US" smtClean="0"/>
-              <a:t>1/22/2016</a:t>
+              <a:t>1/24/2016</a:t>
             </a:fld>
             <a:endParaRPr lang="en-US"/>
           </a:p>
@@ -605,7 +605,7 @@
           <a:p>
             <a:fld id="{6E936EF6-BF30-429C-A441-C377F1C3A04C}" type="datetimeFigureOut">
               <a:rPr lang="en-US" smtClean="0"/>
-              <a:t>1/22/2016</a:t>
+              <a:t>1/24/2016</a:t>
             </a:fld>
             <a:endParaRPr lang="en-US"/>
           </a:p>
@@ -775,7 +775,7 @@
           <a:p>
             <a:fld id="{6E936EF6-BF30-429C-A441-C377F1C3A04C}" type="datetimeFigureOut">
               <a:rPr lang="en-US" smtClean="0"/>
-              <a:t>1/22/2016</a:t>
+              <a:t>1/24/2016</a:t>
             </a:fld>
             <a:endParaRPr lang="en-US"/>
           </a:p>
@@ -1021,7 +1021,7 @@
           <a:p>
             <a:fld id="{6E936EF6-BF30-429C-A441-C377F1C3A04C}" type="datetimeFigureOut">
               <a:rPr lang="en-US" smtClean="0"/>
-              <a:t>1/22/2016</a:t>
+              <a:t>1/24/2016</a:t>
             </a:fld>
             <a:endParaRPr lang="en-US"/>
           </a:p>
@@ -1253,7 +1253,7 @@
           <a:p>
             <a:fld id="{6E936EF6-BF30-429C-A441-C377F1C3A04C}" type="datetimeFigureOut">
               <a:rPr lang="en-US" smtClean="0"/>
-              <a:t>1/22/2016</a:t>
+              <a:t>1/24/2016</a:t>
             </a:fld>
             <a:endParaRPr lang="en-US"/>
           </a:p>
@@ -1620,7 +1620,7 @@
           <a:p>
             <a:fld id="{6E936EF6-BF30-429C-A441-C377F1C3A04C}" type="datetimeFigureOut">
               <a:rPr lang="en-US" smtClean="0"/>
-              <a:t>1/22/2016</a:t>
+              <a:t>1/24/2016</a:t>
             </a:fld>
             <a:endParaRPr lang="en-US"/>
           </a:p>
@@ -1738,7 +1738,7 @@
           <a:p>
             <a:fld id="{6E936EF6-BF30-429C-A441-C377F1C3A04C}" type="datetimeFigureOut">
               <a:rPr lang="en-US" smtClean="0"/>
-              <a:t>1/22/2016</a:t>
+              <a:t>1/24/2016</a:t>
             </a:fld>
             <a:endParaRPr lang="en-US"/>
           </a:p>
@@ -1833,7 +1833,7 @@
           <a:p>
             <a:fld id="{6E936EF6-BF30-429C-A441-C377F1C3A04C}" type="datetimeFigureOut">
               <a:rPr lang="en-US" smtClean="0"/>
-              <a:t>1/22/2016</a:t>
+              <a:t>1/24/2016</a:t>
             </a:fld>
             <a:endParaRPr lang="en-US"/>
           </a:p>
@@ -2110,7 +2110,7 @@
           <a:p>
             <a:fld id="{6E936EF6-BF30-429C-A441-C377F1C3A04C}" type="datetimeFigureOut">
               <a:rPr lang="en-US" smtClean="0"/>
-              <a:t>1/22/2016</a:t>
+              <a:t>1/24/2016</a:t>
             </a:fld>
             <a:endParaRPr lang="en-US"/>
           </a:p>
@@ -2363,7 +2363,7 @@
           <a:p>
             <a:fld id="{6E936EF6-BF30-429C-A441-C377F1C3A04C}" type="datetimeFigureOut">
               <a:rPr lang="en-US" smtClean="0"/>
-              <a:t>1/22/2016</a:t>
+              <a:t>1/24/2016</a:t>
             </a:fld>
             <a:endParaRPr lang="en-US"/>
           </a:p>
@@ -2576,7 +2576,7 @@
           <a:p>
             <a:fld id="{6E936EF6-BF30-429C-A441-C377F1C3A04C}" type="datetimeFigureOut">
               <a:rPr lang="en-US" smtClean="0"/>
-              <a:t>1/22/2016</a:t>
+              <a:t>1/24/2016</a:t>
             </a:fld>
             <a:endParaRPr lang="en-US"/>
           </a:p>
@@ -3688,8 +3688,10 @@
       </p:grpSpPr>
       <p:pic>
         <p:nvPicPr>
-          <p:cNvPr id="2" name="Picture 1"/>
-          <p:cNvPicPr/>
+          <p:cNvPr id="3" name="Picture 2"/>
+          <p:cNvPicPr>
+            <a:picLocks noChangeAspect="1"/>
+          </p:cNvPicPr>
           <p:nvPr/>
         </p:nvPicPr>
         <p:blipFill>
@@ -3700,8 +3702,8 @@
         </p:blipFill>
         <p:spPr>
           <a:xfrm>
-            <a:off x="3109595" y="674687"/>
-            <a:ext cx="5972810" cy="5508625"/>
+            <a:off x="2662666" y="262333"/>
+            <a:ext cx="6866667" cy="6333333"/>
           </a:xfrm>
           <a:prstGeom prst="rect">
             <a:avLst/>
@@ -3844,7 +3846,7 @@
       </p:grpSpPr>
       <p:pic>
         <p:nvPicPr>
-          <p:cNvPr id="2" name="Picture 1"/>
+          <p:cNvPr id="3" name="Picture 2"/>
           <p:cNvPicPr/>
           <p:nvPr/>
         </p:nvPicPr>

</xml_diff>

<commit_message>
change values in presentation
</commit_message>
<xml_diff>
--- a/Лятна почивка.pptx
+++ b/Лятна почивка.pptx
@@ -255,7 +255,7 @@
           <a:p>
             <a:fld id="{6E936EF6-BF30-429C-A441-C377F1C3A04C}" type="datetimeFigureOut">
               <a:rPr lang="en-US" smtClean="0"/>
-              <a:t>1/24/2016</a:t>
+              <a:t>1/27/2016</a:t>
             </a:fld>
             <a:endParaRPr lang="en-US"/>
           </a:p>
@@ -425,7 +425,7 @@
           <a:p>
             <a:fld id="{6E936EF6-BF30-429C-A441-C377F1C3A04C}" type="datetimeFigureOut">
               <a:rPr lang="en-US" smtClean="0"/>
-              <a:t>1/24/2016</a:t>
+              <a:t>1/27/2016</a:t>
             </a:fld>
             <a:endParaRPr lang="en-US"/>
           </a:p>
@@ -605,7 +605,7 @@
           <a:p>
             <a:fld id="{6E936EF6-BF30-429C-A441-C377F1C3A04C}" type="datetimeFigureOut">
               <a:rPr lang="en-US" smtClean="0"/>
-              <a:t>1/24/2016</a:t>
+              <a:t>1/27/2016</a:t>
             </a:fld>
             <a:endParaRPr lang="en-US"/>
           </a:p>
@@ -775,7 +775,7 @@
           <a:p>
             <a:fld id="{6E936EF6-BF30-429C-A441-C377F1C3A04C}" type="datetimeFigureOut">
               <a:rPr lang="en-US" smtClean="0"/>
-              <a:t>1/24/2016</a:t>
+              <a:t>1/27/2016</a:t>
             </a:fld>
             <a:endParaRPr lang="en-US"/>
           </a:p>
@@ -1021,7 +1021,7 @@
           <a:p>
             <a:fld id="{6E936EF6-BF30-429C-A441-C377F1C3A04C}" type="datetimeFigureOut">
               <a:rPr lang="en-US" smtClean="0"/>
-              <a:t>1/24/2016</a:t>
+              <a:t>1/27/2016</a:t>
             </a:fld>
             <a:endParaRPr lang="en-US"/>
           </a:p>
@@ -1253,7 +1253,7 @@
           <a:p>
             <a:fld id="{6E936EF6-BF30-429C-A441-C377F1C3A04C}" type="datetimeFigureOut">
               <a:rPr lang="en-US" smtClean="0"/>
-              <a:t>1/24/2016</a:t>
+              <a:t>1/27/2016</a:t>
             </a:fld>
             <a:endParaRPr lang="en-US"/>
           </a:p>
@@ -1620,7 +1620,7 @@
           <a:p>
             <a:fld id="{6E936EF6-BF30-429C-A441-C377F1C3A04C}" type="datetimeFigureOut">
               <a:rPr lang="en-US" smtClean="0"/>
-              <a:t>1/24/2016</a:t>
+              <a:t>1/27/2016</a:t>
             </a:fld>
             <a:endParaRPr lang="en-US"/>
           </a:p>
@@ -1738,7 +1738,7 @@
           <a:p>
             <a:fld id="{6E936EF6-BF30-429C-A441-C377F1C3A04C}" type="datetimeFigureOut">
               <a:rPr lang="en-US" smtClean="0"/>
-              <a:t>1/24/2016</a:t>
+              <a:t>1/27/2016</a:t>
             </a:fld>
             <a:endParaRPr lang="en-US"/>
           </a:p>
@@ -1833,7 +1833,7 @@
           <a:p>
             <a:fld id="{6E936EF6-BF30-429C-A441-C377F1C3A04C}" type="datetimeFigureOut">
               <a:rPr lang="en-US" smtClean="0"/>
-              <a:t>1/24/2016</a:t>
+              <a:t>1/27/2016</a:t>
             </a:fld>
             <a:endParaRPr lang="en-US"/>
           </a:p>
@@ -2110,7 +2110,7 @@
           <a:p>
             <a:fld id="{6E936EF6-BF30-429C-A441-C377F1C3A04C}" type="datetimeFigureOut">
               <a:rPr lang="en-US" smtClean="0"/>
-              <a:t>1/24/2016</a:t>
+              <a:t>1/27/2016</a:t>
             </a:fld>
             <a:endParaRPr lang="en-US"/>
           </a:p>
@@ -2363,7 +2363,7 @@
           <a:p>
             <a:fld id="{6E936EF6-BF30-429C-A441-C377F1C3A04C}" type="datetimeFigureOut">
               <a:rPr lang="en-US" smtClean="0"/>
-              <a:t>1/24/2016</a:t>
+              <a:t>1/27/2016</a:t>
             </a:fld>
             <a:endParaRPr lang="en-US"/>
           </a:p>
@@ -2576,7 +2576,7 @@
           <a:p>
             <a:fld id="{6E936EF6-BF30-429C-A441-C377F1C3A04C}" type="datetimeFigureOut">
               <a:rPr lang="en-US" smtClean="0"/>
-              <a:t>1/24/2016</a:t>
+              <a:t>1/27/2016</a:t>
             </a:fld>
             <a:endParaRPr lang="en-US"/>
           </a:p>
@@ -3303,11 +3303,23 @@
             </a:r>
             <a:r>
               <a:rPr lang="bg-BG" dirty="0"/>
-              <a:t>p-value = 0.6376</a:t>
+              <a:t>p-value = </a:t>
             </a:r>
             <a:r>
               <a:rPr lang="bg-BG" dirty="0" smtClean="0"/>
-              <a:t>) или предпочитана компания (</a:t>
+              <a:t>0.</a:t>
+            </a:r>
+            <a:r>
+              <a:rPr lang="en-US" dirty="0" smtClean="0"/>
+              <a:t>5963</a:t>
+            </a:r>
+            <a:r>
+              <a:rPr lang="bg-BG" dirty="0" smtClean="0"/>
+              <a:t>) </a:t>
+            </a:r>
+            <a:r>
+              <a:rPr lang="bg-BG" dirty="0" smtClean="0"/>
+              <a:t>или предпочитана компания (</a:t>
             </a:r>
             <a:r>
               <a:rPr lang="bg-BG" dirty="0"/>
@@ -3320,29 +3332,19 @@
           </a:p>
           <a:p>
             <a:r>
+              <a:rPr lang="bg-BG" dirty="0"/>
+              <a:t>Изненадващо, тези които желаят по-дълга почивка, нямат предпочитание да носят със себе си повече багаж (p-value = 0.4627)</a:t>
+            </a:r>
+            <a:endParaRPr lang="en-US"/>
+          </a:p>
+          <a:p>
+            <a:r>
               <a:rPr lang="bg-BG" dirty="0" smtClean="0"/>
-              <a:t>Тези, които предпочитат дълга почивка, носят повече багаж </a:t>
-            </a:r>
-            <a:br>
-              <a:rPr lang="bg-BG" dirty="0" smtClean="0"/>
-            </a:br>
-            <a:r>
-              <a:rPr lang="bg-BG" dirty="0" smtClean="0"/>
-              <a:t>(</a:t>
+              <a:t>Жените </a:t>
             </a:r>
             <a:r>
               <a:rPr lang="bg-BG" dirty="0"/>
-              <a:t>p-value = 0.05162</a:t>
-            </a:r>
-            <a:r>
-              <a:rPr lang="bg-BG" dirty="0" smtClean="0"/>
-              <a:t>).</a:t>
-            </a:r>
-          </a:p>
-          <a:p>
-            <a:r>
-              <a:rPr lang="bg-BG" dirty="0"/>
-              <a:t>Жените предпочитат да носят повече багаж от </a:t>
+              <a:t>предпочитат да носят повече багаж от </a:t>
             </a:r>
             <a:r>
               <a:rPr lang="bg-BG" dirty="0" smtClean="0"/>

</xml_diff>